<commit_message>
Add github account and edited README
</commit_message>
<xml_diff>
--- a/LightSwitchAppsPublishing-toni.pptx
+++ b/LightSwitchAppsPublishing-toni.pptx
@@ -5192,13 +5192,8 @@
             </a:pPr>
             <a:r>
               <a:rPr lang="id-ID" sz="3600" dirty="0" smtClean="0"/>
-              <a:t>Toni Dermawan </a:t>
-            </a:r>
-            <a:r>
-              <a:rPr lang="id-ID" sz="3600" dirty="0" smtClean="0"/>
-              <a:t>Yuliyanto</a:t>
-            </a:r>
-            <a:endParaRPr lang="id-ID" sz="3600" dirty="0" smtClean="0"/>
+              <a:t>Toni Dermawan Yuliyanto</a:t>
+            </a:r>
           </a:p>
           <a:p>
             <a:pPr marL="0" indent="0">
@@ -5240,11 +5235,7 @@
             </a:pPr>
             <a:r>
               <a:rPr lang="id-ID" sz="3600" dirty="0" smtClean="0"/>
-              <a:t>Mail = </a:t>
-            </a:r>
-            <a:r>
-              <a:rPr lang="id-ID" sz="3600" dirty="0" smtClean="0"/>
-              <a:t>toni@erudeye.co.id</a:t>
+              <a:t>Mail = toni@erudeye.co.id</a:t>
             </a:r>
           </a:p>
           <a:p>
@@ -5397,6 +5388,189 @@
               <a:t>support LightSwitch hosting.</a:t>
             </a:r>
             <a:endParaRPr lang="id-ID" sz="3600" dirty="0"/>
+          </a:p>
+        </p:txBody>
+      </p:sp>
+      <p:sp>
+        <p:nvSpPr>
+          <p:cNvPr id="5" name="Content Placeholder 2"/>
+          <p:cNvSpPr txBox="1">
+            <a:spLocks/>
+          </p:cNvSpPr>
+          <p:nvPr/>
+        </p:nvSpPr>
+        <p:spPr>
+          <a:xfrm>
+            <a:off x="3779912" y="4454624"/>
+            <a:ext cx="5112568" cy="2016224"/>
+          </a:xfrm>
+          <a:prstGeom prst="rect">
+            <a:avLst/>
+          </a:prstGeom>
+        </p:spPr>
+        <p:txBody>
+          <a:bodyPr vert="horz" lIns="91440" tIns="45720" rIns="91440" bIns="45720" rtlCol="0">
+            <a:noAutofit/>
+          </a:bodyPr>
+          <a:lstStyle>
+            <a:lvl1pPr marL="342900" indent="-342900" algn="l" defTabSz="914400" rtl="0" eaLnBrk="1" latinLnBrk="0" hangingPunct="1">
+              <a:spcBef>
+                <a:spcPct val="20000"/>
+              </a:spcBef>
+              <a:buFont typeface="Arial" pitchFamily="34" charset="0"/>
+              <a:buChar char="•"/>
+              <a:defRPr sz="3200" kern="1200">
+                <a:solidFill>
+                  <a:schemeClr val="tx1"/>
+                </a:solidFill>
+                <a:latin typeface="+mn-lt"/>
+                <a:ea typeface="+mn-ea"/>
+                <a:cs typeface="+mn-cs"/>
+              </a:defRPr>
+            </a:lvl1pPr>
+            <a:lvl2pPr marL="742950" indent="-285750" algn="l" defTabSz="914400" rtl="0" eaLnBrk="1" latinLnBrk="0" hangingPunct="1">
+              <a:spcBef>
+                <a:spcPct val="20000"/>
+              </a:spcBef>
+              <a:buFont typeface="Arial" pitchFamily="34" charset="0"/>
+              <a:buChar char="–"/>
+              <a:defRPr sz="2800" kern="1200">
+                <a:solidFill>
+                  <a:schemeClr val="tx1"/>
+                </a:solidFill>
+                <a:latin typeface="+mn-lt"/>
+                <a:ea typeface="+mn-ea"/>
+                <a:cs typeface="+mn-cs"/>
+              </a:defRPr>
+            </a:lvl2pPr>
+            <a:lvl3pPr marL="1143000" indent="-228600" algn="l" defTabSz="914400" rtl="0" eaLnBrk="1" latinLnBrk="0" hangingPunct="1">
+              <a:spcBef>
+                <a:spcPct val="20000"/>
+              </a:spcBef>
+              <a:buFont typeface="Arial" pitchFamily="34" charset="0"/>
+              <a:buChar char="•"/>
+              <a:defRPr sz="2400" kern="1200">
+                <a:solidFill>
+                  <a:schemeClr val="tx1"/>
+                </a:solidFill>
+                <a:latin typeface="+mn-lt"/>
+                <a:ea typeface="+mn-ea"/>
+                <a:cs typeface="+mn-cs"/>
+              </a:defRPr>
+            </a:lvl3pPr>
+            <a:lvl4pPr marL="1600200" indent="-228600" algn="l" defTabSz="914400" rtl="0" eaLnBrk="1" latinLnBrk="0" hangingPunct="1">
+              <a:spcBef>
+                <a:spcPct val="20000"/>
+              </a:spcBef>
+              <a:buFont typeface="Arial" pitchFamily="34" charset="0"/>
+              <a:buChar char="–"/>
+              <a:defRPr sz="2000" kern="1200">
+                <a:solidFill>
+                  <a:schemeClr val="tx1"/>
+                </a:solidFill>
+                <a:latin typeface="+mn-lt"/>
+                <a:ea typeface="+mn-ea"/>
+                <a:cs typeface="+mn-cs"/>
+              </a:defRPr>
+            </a:lvl4pPr>
+            <a:lvl5pPr marL="2057400" indent="-228600" algn="l" defTabSz="914400" rtl="0" eaLnBrk="1" latinLnBrk="0" hangingPunct="1">
+              <a:spcBef>
+                <a:spcPct val="20000"/>
+              </a:spcBef>
+              <a:buFont typeface="Arial" pitchFamily="34" charset="0"/>
+              <a:buChar char="»"/>
+              <a:defRPr sz="2000" kern="1200">
+                <a:solidFill>
+                  <a:schemeClr val="tx1"/>
+                </a:solidFill>
+                <a:latin typeface="+mn-lt"/>
+                <a:ea typeface="+mn-ea"/>
+                <a:cs typeface="+mn-cs"/>
+              </a:defRPr>
+            </a:lvl5pPr>
+            <a:lvl6pPr marL="2514600" indent="-228600" algn="l" defTabSz="914400" rtl="0" eaLnBrk="1" latinLnBrk="0" hangingPunct="1">
+              <a:spcBef>
+                <a:spcPct val="20000"/>
+              </a:spcBef>
+              <a:buFont typeface="Arial" pitchFamily="34" charset="0"/>
+              <a:buChar char="•"/>
+              <a:defRPr sz="2000" kern="1200">
+                <a:solidFill>
+                  <a:schemeClr val="tx1"/>
+                </a:solidFill>
+                <a:latin typeface="+mn-lt"/>
+                <a:ea typeface="+mn-ea"/>
+                <a:cs typeface="+mn-cs"/>
+              </a:defRPr>
+            </a:lvl6pPr>
+            <a:lvl7pPr marL="2971800" indent="-228600" algn="l" defTabSz="914400" rtl="0" eaLnBrk="1" latinLnBrk="0" hangingPunct="1">
+              <a:spcBef>
+                <a:spcPct val="20000"/>
+              </a:spcBef>
+              <a:buFont typeface="Arial" pitchFamily="34" charset="0"/>
+              <a:buChar char="•"/>
+              <a:defRPr sz="2000" kern="1200">
+                <a:solidFill>
+                  <a:schemeClr val="tx1"/>
+                </a:solidFill>
+                <a:latin typeface="+mn-lt"/>
+                <a:ea typeface="+mn-ea"/>
+                <a:cs typeface="+mn-cs"/>
+              </a:defRPr>
+            </a:lvl7pPr>
+            <a:lvl8pPr marL="3429000" indent="-228600" algn="l" defTabSz="914400" rtl="0" eaLnBrk="1" latinLnBrk="0" hangingPunct="1">
+              <a:spcBef>
+                <a:spcPct val="20000"/>
+              </a:spcBef>
+              <a:buFont typeface="Arial" pitchFamily="34" charset="0"/>
+              <a:buChar char="•"/>
+              <a:defRPr sz="2000" kern="1200">
+                <a:solidFill>
+                  <a:schemeClr val="tx1"/>
+                </a:solidFill>
+                <a:latin typeface="+mn-lt"/>
+                <a:ea typeface="+mn-ea"/>
+                <a:cs typeface="+mn-cs"/>
+              </a:defRPr>
+            </a:lvl8pPr>
+            <a:lvl9pPr marL="3886200" indent="-228600" algn="l" defTabSz="914400" rtl="0" eaLnBrk="1" latinLnBrk="0" hangingPunct="1">
+              <a:spcBef>
+                <a:spcPct val="20000"/>
+              </a:spcBef>
+              <a:buFont typeface="Arial" pitchFamily="34" charset="0"/>
+              <a:buChar char="•"/>
+              <a:defRPr sz="2000" kern="1200">
+                <a:solidFill>
+                  <a:schemeClr val="tx1"/>
+                </a:solidFill>
+                <a:latin typeface="+mn-lt"/>
+                <a:ea typeface="+mn-ea"/>
+                <a:cs typeface="+mn-cs"/>
+              </a:defRPr>
+            </a:lvl9pPr>
+          </a:lstStyle>
+          <a:p>
+            <a:pPr marL="0" indent="0">
+              <a:buNone/>
+            </a:pPr>
+            <a:r>
+              <a:rPr lang="id-ID" sz="3600" dirty="0" smtClean="0"/>
+              <a:t>Want this slide?</a:t>
+            </a:r>
+          </a:p>
+          <a:p>
+            <a:pPr marL="0" indent="0">
+              <a:buNone/>
+            </a:pPr>
+            <a:r>
+              <a:rPr lang="id-ID" sz="3600" dirty="0" smtClean="0"/>
+              <a:t>check at </a:t>
+            </a:r>
+            <a:r>
+              <a:rPr lang="id-ID" sz="3600" b="1" dirty="0" smtClean="0"/>
+              <a:t>github.com/tonidy</a:t>
+            </a:r>
+            <a:endParaRPr lang="id-ID" sz="3600" b="1" dirty="0"/>
           </a:p>
         </p:txBody>
       </p:sp>

</xml_diff>